<commit_message>
minor M3 slides edit
</commit_message>
<xml_diff>
--- a/Week06-07/M3_slides/Lab3_1.pptx
+++ b/Week06-07/M3_slides/Lab3_1.pptx
@@ -291,7 +291,7 @@
           <a:p>
             <a:fld id="{1205BC88-DBF0-4610-A802-A09E0A6ECD22}" type="datetimeFigureOut">
               <a:rPr lang="en-AU" smtClean="0"/>
-              <a:t>23/08/2023</a:t>
+              <a:t>12/09/2023</a:t>
             </a:fld>
             <a:endParaRPr lang="en-AU"/>
           </a:p>
@@ -519,7 +519,7 @@
           <a:p>
             <a:fld id="{1205BC88-DBF0-4610-A802-A09E0A6ECD22}" type="datetimeFigureOut">
               <a:rPr lang="en-AU" smtClean="0"/>
-              <a:t>23/08/2023</a:t>
+              <a:t>12/09/2023</a:t>
             </a:fld>
             <a:endParaRPr lang="en-AU"/>
           </a:p>
@@ -699,7 +699,7 @@
           <a:p>
             <a:fld id="{1205BC88-DBF0-4610-A802-A09E0A6ECD22}" type="datetimeFigureOut">
               <a:rPr lang="en-AU" smtClean="0"/>
-              <a:t>23/08/2023</a:t>
+              <a:t>12/09/2023</a:t>
             </a:fld>
             <a:endParaRPr lang="en-AU"/>
           </a:p>
@@ -869,7 +869,7 @@
           <a:p>
             <a:fld id="{1205BC88-DBF0-4610-A802-A09E0A6ECD22}" type="datetimeFigureOut">
               <a:rPr lang="en-AU" smtClean="0"/>
-              <a:t>23/08/2023</a:t>
+              <a:t>12/09/2023</a:t>
             </a:fld>
             <a:endParaRPr lang="en-AU"/>
           </a:p>
@@ -1123,7 +1123,7 @@
           <a:p>
             <a:fld id="{1205BC88-DBF0-4610-A802-A09E0A6ECD22}" type="datetimeFigureOut">
               <a:rPr lang="en-AU" smtClean="0"/>
-              <a:t>23/08/2023</a:t>
+              <a:t>12/09/2023</a:t>
             </a:fld>
             <a:endParaRPr lang="en-AU"/>
           </a:p>
@@ -1449,7 +1449,7 @@
           <a:p>
             <a:fld id="{1205BC88-DBF0-4610-A802-A09E0A6ECD22}" type="datetimeFigureOut">
               <a:rPr lang="en-AU" smtClean="0"/>
-              <a:t>23/08/2023</a:t>
+              <a:t>12/09/2023</a:t>
             </a:fld>
             <a:endParaRPr lang="en-AU"/>
           </a:p>
@@ -1900,7 +1900,7 @@
           <a:p>
             <a:fld id="{1205BC88-DBF0-4610-A802-A09E0A6ECD22}" type="datetimeFigureOut">
               <a:rPr lang="en-AU" smtClean="0"/>
-              <a:t>23/08/2023</a:t>
+              <a:t>12/09/2023</a:t>
             </a:fld>
             <a:endParaRPr lang="en-AU"/>
           </a:p>
@@ -2018,7 +2018,7 @@
           <a:p>
             <a:fld id="{1205BC88-DBF0-4610-A802-A09E0A6ECD22}" type="datetimeFigureOut">
               <a:rPr lang="en-AU" smtClean="0"/>
-              <a:t>23/08/2023</a:t>
+              <a:t>12/09/2023</a:t>
             </a:fld>
             <a:endParaRPr lang="en-AU"/>
           </a:p>
@@ -2113,7 +2113,7 @@
           <a:p>
             <a:fld id="{1205BC88-DBF0-4610-A802-A09E0A6ECD22}" type="datetimeFigureOut">
               <a:rPr lang="en-AU" smtClean="0"/>
-              <a:t>23/08/2023</a:t>
+              <a:t>12/09/2023</a:t>
             </a:fld>
             <a:endParaRPr lang="en-AU"/>
           </a:p>
@@ -2400,7 +2400,7 @@
           <a:p>
             <a:fld id="{1205BC88-DBF0-4610-A802-A09E0A6ECD22}" type="datetimeFigureOut">
               <a:rPr lang="en-AU" smtClean="0"/>
-              <a:t>23/08/2023</a:t>
+              <a:t>12/09/2023</a:t>
             </a:fld>
             <a:endParaRPr lang="en-AU"/>
           </a:p>
@@ -2722,7 +2722,7 @@
           <a:p>
             <a:fld id="{1205BC88-DBF0-4610-A802-A09E0A6ECD22}" type="datetimeFigureOut">
               <a:rPr lang="en-AU" smtClean="0"/>
-              <a:t>23/08/2023</a:t>
+              <a:t>12/09/2023</a:t>
             </a:fld>
             <a:endParaRPr lang="en-AU"/>
           </a:p>
@@ -2976,7 +2976,7 @@
           <a:p>
             <a:fld id="{1205BC88-DBF0-4610-A802-A09E0A6ECD22}" type="datetimeFigureOut">
               <a:rPr lang="en-AU" smtClean="0"/>
-              <a:t>23/08/2023</a:t>
+              <a:t>12/09/2023</a:t>
             </a:fld>
             <a:endParaRPr lang="en-AU"/>
           </a:p>
@@ -6575,7 +6575,7 @@
         <p:spPr>
           <a:xfrm>
             <a:off x="666931" y="1104222"/>
-            <a:ext cx="11336318" cy="2862322"/>
+            <a:ext cx="11336318" cy="2585323"/>
           </a:xfrm>
           <a:prstGeom prst="rect">
             <a:avLst/>
@@ -6619,25 +6619,7 @@
             </a:pPr>
             <a:r>
               <a:rPr lang="en-AU" dirty="0"/>
-              <a:t>You can resize the images to 320 x 320 (</a:t>
-            </a:r>
-            <a:r>
-              <a:rPr lang="en-AU" dirty="0" err="1"/>
-              <a:t>PenguinPi’s</a:t>
-            </a:r>
-            <a:r>
-              <a:rPr lang="en-AU" dirty="0"/>
-              <a:t> camera resolution is 640 x 480)</a:t>
-            </a:r>
-          </a:p>
-          <a:p>
-            <a:pPr marL="285750" indent="-285750">
-              <a:buFont typeface="Arial" panose="020B0604020202020204" pitchFamily="34" charset="0"/>
-              <a:buChar char="•"/>
-            </a:pPr>
-            <a:r>
-              <a:rPr lang="en-AU" dirty="0"/>
-              <a:t>You can also use the image augmentation options of </a:t>
+              <a:t>You can use the image augmentation options of </a:t>
             </a:r>
             <a:r>
               <a:rPr lang="en-AU" dirty="0" err="1"/>

</xml_diff>